<commit_message>
javascript variables and datatypes
</commit_message>
<xml_diff>
--- a/javascript/Javascript_1.pptx
+++ b/javascript/Javascript_1.pptx
@@ -247,7 +247,7 @@
           <a:p>
             <a:fld id="{0D0E8B87-35CF-4BD9-9B75-A6B7F1AB1E2C}" type="datetimeFigureOut">
               <a:rPr lang="en-US" smtClean="0"/>
-              <a:t>8/17/2023</a:t>
+              <a:t>8/18/2023</a:t>
             </a:fld>
             <a:endParaRPr lang="en-US"/>
           </a:p>
@@ -424,7 +424,7 @@
           <a:p>
             <a:fld id="{A332326D-A2F0-4093-98BE-D0ABF0B7E9EF}" type="datetimeFigureOut">
               <a:rPr lang="en-US" noProof="0" smtClean="0"/>
-              <a:t>8/17/2023</a:t>
+              <a:t>8/18/2023</a:t>
             </a:fld>
             <a:endParaRPr lang="en-US" noProof="0"/>
           </a:p>
@@ -3757,7 +3757,7 @@
           <a:p>
             <a:fld id="{F90A2B57-AC62-4574-AC7D-7953A169D2FB}" type="datetimeFigureOut">
               <a:rPr lang="en-US" noProof="0" smtClean="0"/>
-              <a:t>8/17/2023</a:t>
+              <a:t>8/18/2023</a:t>
             </a:fld>
             <a:endParaRPr lang="en-US" noProof="0"/>
           </a:p>
@@ -6817,7 +6817,7 @@
           <a:p>
             <a:fld id="{F90A2B57-AC62-4574-AC7D-7953A169D2FB}" type="datetimeFigureOut">
               <a:rPr lang="en-US" noProof="0" smtClean="0"/>
-              <a:t>8/17/2023</a:t>
+              <a:t>8/18/2023</a:t>
             </a:fld>
             <a:endParaRPr lang="en-US" noProof="0"/>
           </a:p>
@@ -15856,7 +15856,7 @@
           <a:p>
             <a:fld id="{F90A2B57-AC62-4574-AC7D-7953A169D2FB}" type="datetimeFigureOut">
               <a:rPr lang="en-US" noProof="0" smtClean="0"/>
-              <a:t>8/17/2023</a:t>
+              <a:t>8/18/2023</a:t>
             </a:fld>
             <a:endParaRPr lang="en-US" noProof="0"/>
           </a:p>
@@ -17895,7 +17895,7 @@
           <a:p>
             <a:fld id="{F90A2B57-AC62-4574-AC7D-7953A169D2FB}" type="datetimeFigureOut">
               <a:rPr lang="en-US" noProof="0" smtClean="0"/>
-              <a:t>8/17/2023</a:t>
+              <a:t>8/18/2023</a:t>
             </a:fld>
             <a:endParaRPr lang="en-US" noProof="0"/>
           </a:p>
@@ -20187,7 +20187,7 @@
           <a:p>
             <a:fld id="{F90A2B57-AC62-4574-AC7D-7953A169D2FB}" type="datetimeFigureOut">
               <a:rPr lang="en-US" noProof="0" smtClean="0"/>
-              <a:t>8/17/2023</a:t>
+              <a:t>8/18/2023</a:t>
             </a:fld>
             <a:endParaRPr lang="en-US" noProof="0"/>
           </a:p>
@@ -22781,7 +22781,7 @@
           <a:p>
             <a:fld id="{F90A2B57-AC62-4574-AC7D-7953A169D2FB}" type="datetimeFigureOut">
               <a:rPr lang="en-US" noProof="0" smtClean="0"/>
-              <a:t>8/17/2023</a:t>
+              <a:t>8/18/2023</a:t>
             </a:fld>
             <a:endParaRPr lang="en-US" noProof="0"/>
           </a:p>
@@ -28770,7 +28770,7 @@
           <a:p>
             <a:fld id="{F90A2B57-AC62-4574-AC7D-7953A169D2FB}" type="datetimeFigureOut">
               <a:rPr lang="en-US" noProof="0" smtClean="0"/>
-              <a:t>8/17/2023</a:t>
+              <a:t>8/18/2023</a:t>
             </a:fld>
             <a:endParaRPr lang="en-US" noProof="0"/>
           </a:p>
@@ -31306,7 +31306,7 @@
           <a:p>
             <a:fld id="{F90A2B57-AC62-4574-AC7D-7953A169D2FB}" type="datetimeFigureOut">
               <a:rPr lang="en-US" noProof="0" smtClean="0"/>
-              <a:t>8/17/2023</a:t>
+              <a:t>8/18/2023</a:t>
             </a:fld>
             <a:endParaRPr lang="en-US" noProof="0"/>
           </a:p>
@@ -32644,7 +32644,7 @@
           <a:p>
             <a:fld id="{F90A2B57-AC62-4574-AC7D-7953A169D2FB}" type="datetimeFigureOut">
               <a:rPr lang="en-US" noProof="0" smtClean="0"/>
-              <a:t>8/17/2023</a:t>
+              <a:t>8/18/2023</a:t>
             </a:fld>
             <a:endParaRPr lang="en-US" noProof="0"/>
           </a:p>
@@ -35031,7 +35031,7 @@
           <a:p>
             <a:fld id="{F90A2B57-AC62-4574-AC7D-7953A169D2FB}" type="datetimeFigureOut">
               <a:rPr lang="en-US" noProof="0" smtClean="0"/>
-              <a:t>8/17/2023</a:t>
+              <a:t>8/18/2023</a:t>
             </a:fld>
             <a:endParaRPr lang="en-US" noProof="0"/>
           </a:p>
@@ -39380,7 +39380,7 @@
           <a:p>
             <a:fld id="{F90A2B57-AC62-4574-AC7D-7953A169D2FB}" type="datetimeFigureOut">
               <a:rPr lang="en-US" noProof="0" smtClean="0"/>
-              <a:t>8/17/2023</a:t>
+              <a:t>8/18/2023</a:t>
             </a:fld>
             <a:endParaRPr lang="en-US" noProof="0"/>
           </a:p>
@@ -41445,7 +41445,7 @@
         </p:nvSpPr>
         <p:spPr>
           <a:xfrm>
-            <a:off x="5324474" y="2287071"/>
+            <a:off x="5324475" y="1982271"/>
             <a:ext cx="6569319" cy="3539430"/>
           </a:xfrm>
           <a:prstGeom prst="rect">
@@ -46184,7 +46184,7 @@
               <a:buAutoNum type="arabicPeriod"/>
             </a:pPr>
             <a:r>
-              <a:rPr lang="en-US" sz="4400" dirty="0"/>
+              <a:rPr lang="en-US" sz="4400" b="1" dirty="0"/>
               <a:t>Programming</a:t>
             </a:r>
           </a:p>
@@ -47510,20 +47510,20 @@
 </file>
 
 <file path=customXml/item1.xml><?xml version="1.0" encoding="utf-8"?>
-<p:properties xmlns:p="http://schemas.microsoft.com/office/2006/metadata/properties" xmlns:xsi="http://www.w3.org/2001/XMLSchema-instance" xmlns:pc="http://schemas.microsoft.com/office/infopath/2007/PartnerControls">
-  <documentManagement>
-    <MediaServiceKeyPoints xmlns="71af3243-3dd4-4a8d-8c0d-dd76da1f02a5" xsi:nil="true"/>
-  </documentManagement>
-</p:properties>
-</file>
-
-<file path=customXml/item2.xml><?xml version="1.0" encoding="utf-8"?>
 <?mso-contentType ?>
 <FormTemplates xmlns="http://schemas.microsoft.com/sharepoint/v3/contenttype/forms">
   <Display>DocumentLibraryForm</Display>
   <Edit>DocumentLibraryForm</Edit>
   <New>DocumentLibraryForm</New>
 </FormTemplates>
+</file>
+
+<file path=customXml/item2.xml><?xml version="1.0" encoding="utf-8"?>
+<p:properties xmlns:p="http://schemas.microsoft.com/office/2006/metadata/properties" xmlns:xsi="http://www.w3.org/2001/XMLSchema-instance" xmlns:pc="http://schemas.microsoft.com/office/infopath/2007/PartnerControls">
+  <documentManagement>
+    <MediaServiceKeyPoints xmlns="71af3243-3dd4-4a8d-8c0d-dd76da1f02a5" xsi:nil="true"/>
+  </documentManagement>
+</p:properties>
 </file>
 
 <file path=customXml/item3.xml><?xml version="1.0" encoding="utf-8"?>
@@ -47738,19 +47738,19 @@
 </file>
 
 <file path=customXml/itemProps1.xml><?xml version="1.0" encoding="utf-8"?>
+<ds:datastoreItem xmlns:ds="http://schemas.openxmlformats.org/officeDocument/2006/customXml" ds:itemID="{631B5746-CAD5-4443-BB83-67B4949E74D6}">
+  <ds:schemaRefs>
+    <ds:schemaRef ds:uri="http://schemas.microsoft.com/sharepoint/v3/contenttype/forms"/>
+  </ds:schemaRefs>
+</ds:datastoreItem>
+</file>
+
+<file path=customXml/itemProps2.xml><?xml version="1.0" encoding="utf-8"?>
 <ds:datastoreItem xmlns:ds="http://schemas.openxmlformats.org/officeDocument/2006/customXml" ds:itemID="{8DE0E54A-B6AE-42DB-94AE-11AE29201034}">
   <ds:schemaRefs>
     <ds:schemaRef ds:uri="http://schemas.microsoft.com/office/2006/metadata/properties"/>
     <ds:schemaRef ds:uri="http://schemas.microsoft.com/office/infopath/2007/PartnerControls"/>
     <ds:schemaRef ds:uri="71af3243-3dd4-4a8d-8c0d-dd76da1f02a5"/>
-  </ds:schemaRefs>
-</ds:datastoreItem>
-</file>
-
-<file path=customXml/itemProps2.xml><?xml version="1.0" encoding="utf-8"?>
-<ds:datastoreItem xmlns:ds="http://schemas.openxmlformats.org/officeDocument/2006/customXml" ds:itemID="{631B5746-CAD5-4443-BB83-67B4949E74D6}">
-  <ds:schemaRefs>
-    <ds:schemaRef ds:uri="http://schemas.microsoft.com/sharepoint/v3/contenttype/forms"/>
   </ds:schemaRefs>
 </ds:datastoreItem>
 </file>

</xml_diff>

<commit_message>
html interview points and datatypes of javascript
</commit_message>
<xml_diff>
--- a/javascript/Javascript_1.pptx
+++ b/javascript/Javascript_1.pptx
@@ -247,7 +247,7 @@
           <a:p>
             <a:fld id="{0D0E8B87-35CF-4BD9-9B75-A6B7F1AB1E2C}" type="datetimeFigureOut">
               <a:rPr lang="en-US" smtClean="0"/>
-              <a:t>8/18/2023</a:t>
+              <a:t>8/19/2023</a:t>
             </a:fld>
             <a:endParaRPr lang="en-US"/>
           </a:p>
@@ -42153,6 +42153,36 @@
             </a:r>
           </a:p>
           <a:p>
+            <a:pPr marL="0" indent="0">
+              <a:buNone/>
+            </a:pPr>
+            <a:r>
+              <a:rPr lang="en-US" dirty="0">
+                <a:solidFill>
+                  <a:srgbClr val="374151"/>
+                </a:solidFill>
+                <a:latin typeface="Söhne"/>
+              </a:rPr>
+              <a:t>:</a:t>
+            </a:r>
+            <a:r>
+              <a:rPr lang="en-US" b="1" dirty="0">
+                <a:solidFill>
+                  <a:srgbClr val="374151"/>
+                </a:solidFill>
+                <a:latin typeface="Söhne"/>
+              </a:rPr>
+              <a:t> default value of any variable </a:t>
+            </a:r>
+            <a:endParaRPr lang="en-US" b="1" i="0" dirty="0">
+              <a:solidFill>
+                <a:srgbClr val="374151"/>
+              </a:solidFill>
+              <a:effectLst/>
+              <a:latin typeface="Söhne"/>
+            </a:endParaRPr>
+          </a:p>
+          <a:p>
             <a:endParaRPr lang="en-US" dirty="0">
               <a:solidFill>
                 <a:srgbClr val="374151"/>
@@ -42196,7 +42226,21 @@
               </a:rPr>
               <a:t>It is also a primitive value that represents the deliberate absence of any object value. It is typically assigned explicitly by the programmer to indicate that a variable or object property intentionally has no value</a:t>
             </a:r>
-            <a:endParaRPr lang="en-IN" dirty="0"/>
+          </a:p>
+          <a:p>
+            <a:pPr marL="0" indent="0">
+              <a:buNone/>
+            </a:pPr>
+            <a:r>
+              <a:rPr lang="en-US" b="1" dirty="0">
+                <a:solidFill>
+                  <a:srgbClr val="374151"/>
+                </a:solidFill>
+                <a:latin typeface="Söhne"/>
+              </a:rPr>
+              <a:t>: Something with no value </a:t>
+            </a:r>
+            <a:endParaRPr lang="en-IN" b="1" dirty="0"/>
           </a:p>
           <a:p>
             <a:endParaRPr lang="en-US" b="0" i="0" dirty="0">
@@ -47510,20 +47554,20 @@
 </file>
 
 <file path=customXml/item1.xml><?xml version="1.0" encoding="utf-8"?>
+<p:properties xmlns:p="http://schemas.microsoft.com/office/2006/metadata/properties" xmlns:xsi="http://www.w3.org/2001/XMLSchema-instance" xmlns:pc="http://schemas.microsoft.com/office/infopath/2007/PartnerControls">
+  <documentManagement>
+    <MediaServiceKeyPoints xmlns="71af3243-3dd4-4a8d-8c0d-dd76da1f02a5" xsi:nil="true"/>
+  </documentManagement>
+</p:properties>
+</file>
+
+<file path=customXml/item2.xml><?xml version="1.0" encoding="utf-8"?>
 <?mso-contentType ?>
 <FormTemplates xmlns="http://schemas.microsoft.com/sharepoint/v3/contenttype/forms">
   <Display>DocumentLibraryForm</Display>
   <Edit>DocumentLibraryForm</Edit>
   <New>DocumentLibraryForm</New>
 </FormTemplates>
-</file>
-
-<file path=customXml/item2.xml><?xml version="1.0" encoding="utf-8"?>
-<p:properties xmlns:p="http://schemas.microsoft.com/office/2006/metadata/properties" xmlns:xsi="http://www.w3.org/2001/XMLSchema-instance" xmlns:pc="http://schemas.microsoft.com/office/infopath/2007/PartnerControls">
-  <documentManagement>
-    <MediaServiceKeyPoints xmlns="71af3243-3dd4-4a8d-8c0d-dd76da1f02a5" xsi:nil="true"/>
-  </documentManagement>
-</p:properties>
 </file>
 
 <file path=customXml/item3.xml><?xml version="1.0" encoding="utf-8"?>
@@ -47738,19 +47782,19 @@
 </file>
 
 <file path=customXml/itemProps1.xml><?xml version="1.0" encoding="utf-8"?>
-<ds:datastoreItem xmlns:ds="http://schemas.openxmlformats.org/officeDocument/2006/customXml" ds:itemID="{631B5746-CAD5-4443-BB83-67B4949E74D6}">
+<ds:datastoreItem xmlns:ds="http://schemas.openxmlformats.org/officeDocument/2006/customXml" ds:itemID="{8DE0E54A-B6AE-42DB-94AE-11AE29201034}">
   <ds:schemaRefs>
-    <ds:schemaRef ds:uri="http://schemas.microsoft.com/sharepoint/v3/contenttype/forms"/>
+    <ds:schemaRef ds:uri="http://schemas.microsoft.com/office/2006/metadata/properties"/>
+    <ds:schemaRef ds:uri="http://schemas.microsoft.com/office/infopath/2007/PartnerControls"/>
+    <ds:schemaRef ds:uri="71af3243-3dd4-4a8d-8c0d-dd76da1f02a5"/>
   </ds:schemaRefs>
 </ds:datastoreItem>
 </file>
 
 <file path=customXml/itemProps2.xml><?xml version="1.0" encoding="utf-8"?>
-<ds:datastoreItem xmlns:ds="http://schemas.openxmlformats.org/officeDocument/2006/customXml" ds:itemID="{8DE0E54A-B6AE-42DB-94AE-11AE29201034}">
+<ds:datastoreItem xmlns:ds="http://schemas.openxmlformats.org/officeDocument/2006/customXml" ds:itemID="{631B5746-CAD5-4443-BB83-67B4949E74D6}">
   <ds:schemaRefs>
-    <ds:schemaRef ds:uri="http://schemas.microsoft.com/office/2006/metadata/properties"/>
-    <ds:schemaRef ds:uri="http://schemas.microsoft.com/office/infopath/2007/PartnerControls"/>
-    <ds:schemaRef ds:uri="71af3243-3dd4-4a8d-8c0d-dd76da1f02a5"/>
+    <ds:schemaRef ds:uri="http://schemas.microsoft.com/sharepoint/v3/contenttype/forms"/>
   </ds:schemaRefs>
 </ds:datastoreItem>
 </file>

</xml_diff>